<commit_message>
corrected presentation and added field test pictures
</commit_message>
<xml_diff>
--- a/Documents/Presentations/PAPR Reduction- PTS.pptx
+++ b/Documents/Presentations/PAPR Reduction- PTS.pptx
@@ -239,7 +239,7 @@
           <a:p>
             <a:fld id="{9D4DBBD4-50DD-45D8-920D-439F8E5106DA}" type="datetimeFigureOut">
               <a:rPr lang="en-US" smtClean="0"/>
-              <a:t>10/11/2017</a:t>
+              <a:t>10/16/2017</a:t>
             </a:fld>
             <a:endParaRPr lang="en-US"/>
           </a:p>
@@ -551,6 +551,174 @@
           <a:bodyPr/>
           <a:lstStyle/>
           <a:p>
+            <a:endParaRPr lang="en-US" dirty="0"/>
+          </a:p>
+        </p:txBody>
+      </p:sp>
+      <p:sp>
+        <p:nvSpPr>
+          <p:cNvPr id="4" name="Slide Number Placeholder 3"/>
+          <p:cNvSpPr>
+            <a:spLocks noGrp="1"/>
+          </p:cNvSpPr>
+          <p:nvPr>
+            <p:ph type="sldNum" sz="quarter" idx="10"/>
+          </p:nvPr>
+        </p:nvSpPr>
+        <p:spPr/>
+        <p:txBody>
+          <a:bodyPr/>
+          <a:lstStyle/>
+          <a:p>
+            <a:fld id="{F80C31EE-3423-46B3-BE0B-167A1707562B}" type="slidenum">
+              <a:rPr lang="en-US" smtClean="0"/>
+              <a:t>6</a:t>
+            </a:fld>
+            <a:endParaRPr lang="en-US"/>
+          </a:p>
+        </p:txBody>
+      </p:sp>
+    </p:spTree>
+    <p:extLst>
+      <p:ext uri="{BB962C8B-B14F-4D97-AF65-F5344CB8AC3E}">
+        <p14:creationId xmlns:p14="http://schemas.microsoft.com/office/powerpoint/2010/main" val="2245879686"/>
+      </p:ext>
+    </p:extLst>
+  </p:cSld>
+  <p:clrMapOvr>
+    <a:masterClrMapping/>
+  </p:clrMapOvr>
+</p:notes>
+</file>
+
+<file path=ppt/notesSlides/notesSlide2.xml><?xml version="1.0" encoding="utf-8"?>
+<p:notes xmlns:a="http://schemas.openxmlformats.org/drawingml/2006/main" xmlns:r="http://schemas.openxmlformats.org/officeDocument/2006/relationships" xmlns:p="http://schemas.openxmlformats.org/presentationml/2006/main">
+  <p:cSld>
+    <p:spTree>
+      <p:nvGrpSpPr>
+        <p:cNvPr id="1" name=""/>
+        <p:cNvGrpSpPr/>
+        <p:nvPr/>
+      </p:nvGrpSpPr>
+      <p:grpSpPr>
+        <a:xfrm>
+          <a:off x="0" y="0"/>
+          <a:ext cx="0" cy="0"/>
+          <a:chOff x="0" y="0"/>
+          <a:chExt cx="0" cy="0"/>
+        </a:xfrm>
+      </p:grpSpPr>
+      <p:sp>
+        <p:nvSpPr>
+          <p:cNvPr id="2" name="Slide Image Placeholder 1"/>
+          <p:cNvSpPr>
+            <a:spLocks noGrp="1" noRot="1" noChangeAspect="1"/>
+          </p:cNvSpPr>
+          <p:nvPr>
+            <p:ph type="sldImg"/>
+          </p:nvPr>
+        </p:nvSpPr>
+        <p:spPr/>
+      </p:sp>
+      <p:sp>
+        <p:nvSpPr>
+          <p:cNvPr id="3" name="Notes Placeholder 2"/>
+          <p:cNvSpPr>
+            <a:spLocks noGrp="1"/>
+          </p:cNvSpPr>
+          <p:nvPr>
+            <p:ph type="body" idx="1"/>
+          </p:nvPr>
+        </p:nvSpPr>
+        <p:spPr/>
+        <p:txBody>
+          <a:bodyPr/>
+          <a:lstStyle/>
+          <a:p>
+            <a:endParaRPr lang="en-US" dirty="0"/>
+          </a:p>
+        </p:txBody>
+      </p:sp>
+      <p:sp>
+        <p:nvSpPr>
+          <p:cNvPr id="4" name="Slide Number Placeholder 3"/>
+          <p:cNvSpPr>
+            <a:spLocks noGrp="1"/>
+          </p:cNvSpPr>
+          <p:nvPr>
+            <p:ph type="sldNum" sz="quarter" idx="10"/>
+          </p:nvPr>
+        </p:nvSpPr>
+        <p:spPr/>
+        <p:txBody>
+          <a:bodyPr/>
+          <a:lstStyle/>
+          <a:p>
+            <a:fld id="{F80C31EE-3423-46B3-BE0B-167A1707562B}" type="slidenum">
+              <a:rPr lang="en-US" smtClean="0"/>
+              <a:t>9</a:t>
+            </a:fld>
+            <a:endParaRPr lang="en-US"/>
+          </a:p>
+        </p:txBody>
+      </p:sp>
+    </p:spTree>
+    <p:extLst>
+      <p:ext uri="{BB962C8B-B14F-4D97-AF65-F5344CB8AC3E}">
+        <p14:creationId xmlns:p14="http://schemas.microsoft.com/office/powerpoint/2010/main" val="515208144"/>
+      </p:ext>
+    </p:extLst>
+  </p:cSld>
+  <p:clrMapOvr>
+    <a:masterClrMapping/>
+  </p:clrMapOvr>
+</p:notes>
+</file>
+
+<file path=ppt/notesSlides/notesSlide3.xml><?xml version="1.0" encoding="utf-8"?>
+<p:notes xmlns:a="http://schemas.openxmlformats.org/drawingml/2006/main" xmlns:r="http://schemas.openxmlformats.org/officeDocument/2006/relationships" xmlns:p="http://schemas.openxmlformats.org/presentationml/2006/main">
+  <p:cSld>
+    <p:spTree>
+      <p:nvGrpSpPr>
+        <p:cNvPr id="1" name=""/>
+        <p:cNvGrpSpPr/>
+        <p:nvPr/>
+      </p:nvGrpSpPr>
+      <p:grpSpPr>
+        <a:xfrm>
+          <a:off x="0" y="0"/>
+          <a:ext cx="0" cy="0"/>
+          <a:chOff x="0" y="0"/>
+          <a:chExt cx="0" cy="0"/>
+        </a:xfrm>
+      </p:grpSpPr>
+      <p:sp>
+        <p:nvSpPr>
+          <p:cNvPr id="2" name="Slide Image Placeholder 1"/>
+          <p:cNvSpPr>
+            <a:spLocks noGrp="1" noRot="1" noChangeAspect="1"/>
+          </p:cNvSpPr>
+          <p:nvPr>
+            <p:ph type="sldImg"/>
+          </p:nvPr>
+        </p:nvSpPr>
+        <p:spPr/>
+      </p:sp>
+      <p:sp>
+        <p:nvSpPr>
+          <p:cNvPr id="3" name="Notes Placeholder 2"/>
+          <p:cNvSpPr>
+            <a:spLocks noGrp="1"/>
+          </p:cNvSpPr>
+          <p:nvPr>
+            <p:ph type="body" idx="1"/>
+          </p:nvPr>
+        </p:nvSpPr>
+        <p:spPr/>
+        <p:txBody>
+          <a:bodyPr/>
+          <a:lstStyle/>
+          <a:p>
             <a:r>
               <a:rPr lang="en-US" dirty="0" smtClean="0"/>
               <a:t>The peak power</a:t>
@@ -730,7 +898,7 @@
           <a:p>
             <a:fld id="{0FFA1DB2-F186-40A4-8E7C-447CEF618330}" type="datetimeFigureOut">
               <a:rPr lang="en-US" smtClean="0"/>
-              <a:t>10/11/2017</a:t>
+              <a:t>10/16/2017</a:t>
             </a:fld>
             <a:endParaRPr lang="en-US"/>
           </a:p>
@@ -900,7 +1068,7 @@
           <a:p>
             <a:fld id="{0FFA1DB2-F186-40A4-8E7C-447CEF618330}" type="datetimeFigureOut">
               <a:rPr lang="en-US" smtClean="0"/>
-              <a:t>10/11/2017</a:t>
+              <a:t>10/16/2017</a:t>
             </a:fld>
             <a:endParaRPr lang="en-US"/>
           </a:p>
@@ -1080,7 +1248,7 @@
           <a:p>
             <a:fld id="{0FFA1DB2-F186-40A4-8E7C-447CEF618330}" type="datetimeFigureOut">
               <a:rPr lang="en-US" smtClean="0"/>
-              <a:t>10/11/2017</a:t>
+              <a:t>10/16/2017</a:t>
             </a:fld>
             <a:endParaRPr lang="en-US"/>
           </a:p>
@@ -1250,7 +1418,7 @@
           <a:p>
             <a:fld id="{0FFA1DB2-F186-40A4-8E7C-447CEF618330}" type="datetimeFigureOut">
               <a:rPr lang="en-US" smtClean="0"/>
-              <a:t>10/11/2017</a:t>
+              <a:t>10/16/2017</a:t>
             </a:fld>
             <a:endParaRPr lang="en-US"/>
           </a:p>
@@ -1496,7 +1664,7 @@
           <a:p>
             <a:fld id="{0FFA1DB2-F186-40A4-8E7C-447CEF618330}" type="datetimeFigureOut">
               <a:rPr lang="en-US" smtClean="0"/>
-              <a:t>10/11/2017</a:t>
+              <a:t>10/16/2017</a:t>
             </a:fld>
             <a:endParaRPr lang="en-US"/>
           </a:p>
@@ -1728,7 +1896,7 @@
           <a:p>
             <a:fld id="{0FFA1DB2-F186-40A4-8E7C-447CEF618330}" type="datetimeFigureOut">
               <a:rPr lang="en-US" smtClean="0"/>
-              <a:t>10/11/2017</a:t>
+              <a:t>10/16/2017</a:t>
             </a:fld>
             <a:endParaRPr lang="en-US"/>
           </a:p>
@@ -2095,7 +2263,7 @@
           <a:p>
             <a:fld id="{0FFA1DB2-F186-40A4-8E7C-447CEF618330}" type="datetimeFigureOut">
               <a:rPr lang="en-US" smtClean="0"/>
-              <a:t>10/11/2017</a:t>
+              <a:t>10/16/2017</a:t>
             </a:fld>
             <a:endParaRPr lang="en-US"/>
           </a:p>
@@ -2213,7 +2381,7 @@
           <a:p>
             <a:fld id="{0FFA1DB2-F186-40A4-8E7C-447CEF618330}" type="datetimeFigureOut">
               <a:rPr lang="en-US" smtClean="0"/>
-              <a:t>10/11/2017</a:t>
+              <a:t>10/16/2017</a:t>
             </a:fld>
             <a:endParaRPr lang="en-US"/>
           </a:p>
@@ -2308,7 +2476,7 @@
           <a:p>
             <a:fld id="{0FFA1DB2-F186-40A4-8E7C-447CEF618330}" type="datetimeFigureOut">
               <a:rPr lang="en-US" smtClean="0"/>
-              <a:t>10/11/2017</a:t>
+              <a:t>10/16/2017</a:t>
             </a:fld>
             <a:endParaRPr lang="en-US"/>
           </a:p>
@@ -2585,7 +2753,7 @@
           <a:p>
             <a:fld id="{0FFA1DB2-F186-40A4-8E7C-447CEF618330}" type="datetimeFigureOut">
               <a:rPr lang="en-US" smtClean="0"/>
-              <a:t>10/11/2017</a:t>
+              <a:t>10/16/2017</a:t>
             </a:fld>
             <a:endParaRPr lang="en-US"/>
           </a:p>
@@ -2838,7 +3006,7 @@
           <a:p>
             <a:fld id="{0FFA1DB2-F186-40A4-8E7C-447CEF618330}" type="datetimeFigureOut">
               <a:rPr lang="en-US" smtClean="0"/>
-              <a:t>10/11/2017</a:t>
+              <a:t>10/16/2017</a:t>
             </a:fld>
             <a:endParaRPr lang="en-US"/>
           </a:p>
@@ -3051,7 +3219,7 @@
           <a:p>
             <a:fld id="{0FFA1DB2-F186-40A4-8E7C-447CEF618330}" type="datetimeFigureOut">
               <a:rPr lang="en-US" smtClean="0"/>
-              <a:t>10/11/2017</a:t>
+              <a:t>10/16/2017</a:t>
             </a:fld>
             <a:endParaRPr lang="en-US"/>
           </a:p>
@@ -3554,7 +3722,6 @@
               <a:rPr lang="en-US" dirty="0"/>
               <a:t>PAPR distribution (CCDF): analytic expression [1]</a:t>
             </a:r>
-            <a:endParaRPr lang="en-US" dirty="0"/>
           </a:p>
         </p:txBody>
       </p:sp>
@@ -3638,7 +3805,7 @@
           <a:graphicData uri="http://schemas.openxmlformats.org/presentationml/2006/ole">
             <mc:AlternateContent xmlns:mc="http://schemas.openxmlformats.org/markup-compatibility/2006">
               <mc:Choice xmlns:v="urn:schemas-microsoft-com:vml" Requires="v">
-                <p:oleObj spid="_x0000_s3270" name="Equation" r:id="rId3" imgW="4178160" imgH="1396800" progId="Equation.DSMT4">
+                <p:oleObj spid="_x0000_s3282" name="Equation" r:id="rId3" imgW="4178160" imgH="1396800" progId="Equation.DSMT4">
                   <p:embed/>
                 </p:oleObj>
               </mc:Choice>
@@ -3695,7 +3862,7 @@
           <a:graphicData uri="http://schemas.openxmlformats.org/presentationml/2006/ole">
             <mc:AlternateContent xmlns:mc="http://schemas.openxmlformats.org/markup-compatibility/2006">
               <mc:Choice xmlns:v="urn:schemas-microsoft-com:vml" Requires="v">
-                <p:oleObj spid="_x0000_s3271" name="Equation" r:id="rId5" imgW="850680" imgH="419040" progId="Equation.DSMT4">
+                <p:oleObj spid="_x0000_s3283" name="Equation" r:id="rId5" imgW="850680" imgH="419040" progId="Equation.DSMT4">
                   <p:embed/>
                 </p:oleObj>
               </mc:Choice>
@@ -3752,7 +3919,7 @@
           <a:graphicData uri="http://schemas.openxmlformats.org/presentationml/2006/ole">
             <mc:AlternateContent xmlns:mc="http://schemas.openxmlformats.org/markup-compatibility/2006">
               <mc:Choice xmlns:v="urn:schemas-microsoft-com:vml" Requires="v">
-                <p:oleObj spid="_x0000_s3272" name="Equation" r:id="rId7" imgW="2844720" imgH="482400" progId="Equation.DSMT4">
+                <p:oleObj spid="_x0000_s3284" name="Equation" r:id="rId7" imgW="2844720" imgH="482400" progId="Equation.DSMT4">
                   <p:embed/>
                 </p:oleObj>
               </mc:Choice>
@@ -3845,11 +4012,7 @@
             </a:r>
             <a:r>
               <a:rPr lang="en-US" dirty="0" smtClean="0"/>
-              <a:t>): Theoretical curves[1</a:t>
-            </a:r>
-            <a:r>
-              <a:rPr lang="en-US" dirty="0" smtClean="0"/>
-              <a:t>]</a:t>
+              <a:t>): Theoretical curves[1]</a:t>
             </a:r>
             <a:endParaRPr lang="en-US" dirty="0"/>
           </a:p>
@@ -3901,7 +4064,7 @@
           <a:graphicData uri="http://schemas.openxmlformats.org/presentationml/2006/ole">
             <mc:AlternateContent xmlns:mc="http://schemas.openxmlformats.org/markup-compatibility/2006">
               <mc:Choice xmlns:v="urn:schemas-microsoft-com:vml" Requires="v">
-                <p:oleObj spid="_x0000_s13319" name="Equation" r:id="rId4" imgW="2412720" imgH="304560" progId="Equation.DSMT4">
+                <p:oleObj spid="_x0000_s13323" name="Equation" r:id="rId4" imgW="2412720" imgH="304560" progId="Equation.DSMT4">
                   <p:embed/>
                 </p:oleObj>
               </mc:Choice>
@@ -4020,7 +4183,9 @@
           </a:xfrm>
         </p:spPr>
         <p:txBody>
-          <a:bodyPr/>
+          <a:bodyPr>
+            <a:normAutofit lnSpcReduction="10000"/>
+          </a:bodyPr>
           <a:lstStyle/>
           <a:p>
             <a:r>
@@ -4045,7 +4210,15 @@
             </a:r>
             <a:r>
               <a:rPr lang="en-US" dirty="0" smtClean="0"/>
-              <a:t>n interpolated N-samples symbol has effectively the non-interpolated PAPR of a 2N-samples symbol </a:t>
+              <a:t>n interpolated N-samples symbol has effectively the </a:t>
+            </a:r>
+            <a:r>
+              <a:rPr lang="en-US" dirty="0" smtClean="0"/>
+              <a:t>non-interpolated theoretical </a:t>
+            </a:r>
+            <a:r>
+              <a:rPr lang="en-US" dirty="0" smtClean="0"/>
+              <a:t>PAPR of a 2N-samples symbol </a:t>
             </a:r>
             <a:endParaRPr lang="en-US" dirty="0"/>
           </a:p>
@@ -4159,22 +4332,13 @@
           <a:p>
             <a:r>
               <a:rPr lang="en-US" dirty="0" smtClean="0"/>
-              <a:t>Th</a:t>
-            </a:r>
-            <a:r>
-              <a:rPr lang="en-US" dirty="0" smtClean="0"/>
-              <a:t>e aim of the interpolation is to obtain the signal peaks</a:t>
-            </a:r>
-            <a:endParaRPr lang="en-US" dirty="0" smtClean="0"/>
-          </a:p>
-          <a:p>
-            <a:r>
-              <a:rPr lang="en-US" dirty="0" smtClean="0"/>
-              <a:t>The </a:t>
-            </a:r>
-            <a:r>
-              <a:rPr lang="en-US" dirty="0" smtClean="0"/>
-              <a:t>effect of increasing the interpolation factor attains a limit</a:t>
+              <a:t>The aim of the interpolation is to obtain the signal peaks</a:t>
+            </a:r>
+          </a:p>
+          <a:p>
+            <a:r>
+              <a:rPr lang="en-US" dirty="0" smtClean="0"/>
+              <a:t>The effect of increasing the interpolation factor attains a limit</a:t>
             </a:r>
           </a:p>
           <a:p>
@@ -4495,13 +4659,55 @@
                 <a:tableStyleId>{5C22544A-7EE6-4342-B048-85BDC9FD1C3A}</a:tableStyleId>
               </a:tblPr>
               <a:tblGrid>
-                <a:gridCol w="1641805"/>
-                <a:gridCol w="1641805"/>
-                <a:gridCol w="1498826"/>
-                <a:gridCol w="1755202"/>
-                <a:gridCol w="1203003"/>
-                <a:gridCol w="1281890"/>
-                <a:gridCol w="1321334"/>
+                <a:gridCol w="1641805">
+                  <a:extLst>
+                    <a:ext uri="{9D8B030D-6E8A-4147-A177-3AD203B41FA5}">
+                      <a16:colId xmlns:a16="http://schemas.microsoft.com/office/drawing/2014/main" val="20000"/>
+                    </a:ext>
+                  </a:extLst>
+                </a:gridCol>
+                <a:gridCol w="1641805">
+                  <a:extLst>
+                    <a:ext uri="{9D8B030D-6E8A-4147-A177-3AD203B41FA5}">
+                      <a16:colId xmlns:a16="http://schemas.microsoft.com/office/drawing/2014/main" val="20001"/>
+                    </a:ext>
+                  </a:extLst>
+                </a:gridCol>
+                <a:gridCol w="1498826">
+                  <a:extLst>
+                    <a:ext uri="{9D8B030D-6E8A-4147-A177-3AD203B41FA5}">
+                      <a16:colId xmlns:a16="http://schemas.microsoft.com/office/drawing/2014/main" val="20002"/>
+                    </a:ext>
+                  </a:extLst>
+                </a:gridCol>
+                <a:gridCol w="1755202">
+                  <a:extLst>
+                    <a:ext uri="{9D8B030D-6E8A-4147-A177-3AD203B41FA5}">
+                      <a16:colId xmlns:a16="http://schemas.microsoft.com/office/drawing/2014/main" val="20003"/>
+                    </a:ext>
+                  </a:extLst>
+                </a:gridCol>
+                <a:gridCol w="1203003">
+                  <a:extLst>
+                    <a:ext uri="{9D8B030D-6E8A-4147-A177-3AD203B41FA5}">
+                      <a16:colId xmlns:a16="http://schemas.microsoft.com/office/drawing/2014/main" val="20004"/>
+                    </a:ext>
+                  </a:extLst>
+                </a:gridCol>
+                <a:gridCol w="1281890">
+                  <a:extLst>
+                    <a:ext uri="{9D8B030D-6E8A-4147-A177-3AD203B41FA5}">
+                      <a16:colId xmlns:a16="http://schemas.microsoft.com/office/drawing/2014/main" val="20005"/>
+                    </a:ext>
+                  </a:extLst>
+                </a:gridCol>
+                <a:gridCol w="1321334">
+                  <a:extLst>
+                    <a:ext uri="{9D8B030D-6E8A-4147-A177-3AD203B41FA5}">
+                      <a16:colId xmlns:a16="http://schemas.microsoft.com/office/drawing/2014/main" val="20006"/>
+                    </a:ext>
+                  </a:extLst>
+                </a:gridCol>
               </a:tblGrid>
               <a:tr h="1361857">
                 <a:tc>
@@ -4676,6 +4882,11 @@
                   </a:txBody>
                   <a:tcPr marL="9525" marR="9525" marT="9525" marB="0" anchor="b"/>
                 </a:tc>
+                <a:extLst>
+                  <a:ext uri="{0D108BD9-81ED-4DB2-BD59-A6C34878D82A}">
+                    <a16:rowId xmlns:a16="http://schemas.microsoft.com/office/drawing/2014/main" val="10000"/>
+                  </a:ext>
+                </a:extLst>
               </a:tr>
               <a:tr h="476650">
                 <a:tc>
@@ -4839,6 +5050,11 @@
                   </a:txBody>
                   <a:tcPr marL="9525" marR="9525" marT="9525" marB="0" anchor="b"/>
                 </a:tc>
+                <a:extLst>
+                  <a:ext uri="{0D108BD9-81ED-4DB2-BD59-A6C34878D82A}">
+                    <a16:rowId xmlns:a16="http://schemas.microsoft.com/office/drawing/2014/main" val="10001"/>
+                  </a:ext>
+                </a:extLst>
               </a:tr>
               <a:tr h="476650">
                 <a:tc>
@@ -5002,6 +5218,11 @@
                   </a:txBody>
                   <a:tcPr marL="9525" marR="9525" marT="9525" marB="0" anchor="b"/>
                 </a:tc>
+                <a:extLst>
+                  <a:ext uri="{0D108BD9-81ED-4DB2-BD59-A6C34878D82A}">
+                    <a16:rowId xmlns:a16="http://schemas.microsoft.com/office/drawing/2014/main" val="10002"/>
+                  </a:ext>
+                </a:extLst>
               </a:tr>
               <a:tr h="476650">
                 <a:tc>
@@ -5171,6 +5392,11 @@
                   </a:txBody>
                   <a:tcPr marL="9525" marR="9525" marT="9525" marB="0" anchor="b"/>
                 </a:tc>
+                <a:extLst>
+                  <a:ext uri="{0D108BD9-81ED-4DB2-BD59-A6C34878D82A}">
+                    <a16:rowId xmlns:a16="http://schemas.microsoft.com/office/drawing/2014/main" val="10003"/>
+                  </a:ext>
+                </a:extLst>
               </a:tr>
               <a:tr h="953299">
                 <a:tc>
@@ -5334,6 +5560,11 @@
                   </a:txBody>
                   <a:tcPr marL="9525" marR="9525" marT="9525" marB="0" anchor="b"/>
                 </a:tc>
+                <a:extLst>
+                  <a:ext uri="{0D108BD9-81ED-4DB2-BD59-A6C34878D82A}">
+                    <a16:rowId xmlns:a16="http://schemas.microsoft.com/office/drawing/2014/main" val="10004"/>
+                  </a:ext>
+                </a:extLst>
               </a:tr>
               <a:tr h="499347">
                 <a:tc>
@@ -5497,6 +5728,11 @@
                   </a:txBody>
                   <a:tcPr marL="9525" marR="9525" marT="9525" marB="0" anchor="b"/>
                 </a:tc>
+                <a:extLst>
+                  <a:ext uri="{0D108BD9-81ED-4DB2-BD59-A6C34878D82A}">
+                    <a16:rowId xmlns:a16="http://schemas.microsoft.com/office/drawing/2014/main" val="10005"/>
+                  </a:ext>
+                </a:extLst>
               </a:tr>
             </a:tbl>
           </a:graphicData>
@@ -6409,7 +6645,7 @@
           <a:graphicData uri="http://schemas.openxmlformats.org/presentationml/2006/ole">
             <mc:AlternateContent xmlns:mc="http://schemas.openxmlformats.org/markup-compatibility/2006">
               <mc:Choice xmlns:v="urn:schemas-microsoft-com:vml" Requires="v">
-                <p:oleObj spid="_x0000_s6373" name="Equation" r:id="rId3" imgW="190440" imgH="304560" progId="Equation.DSMT4">
+                <p:oleObj spid="_x0000_s6393" name="Equation" r:id="rId3" imgW="190440" imgH="304560" progId="Equation.DSMT4">
                   <p:embed/>
                 </p:oleObj>
               </mc:Choice>
@@ -6466,7 +6702,7 @@
           <a:graphicData uri="http://schemas.openxmlformats.org/presentationml/2006/ole">
             <mc:AlternateContent xmlns:mc="http://schemas.openxmlformats.org/markup-compatibility/2006">
               <mc:Choice xmlns:v="urn:schemas-microsoft-com:vml" Requires="v">
-                <p:oleObj spid="_x0000_s6374" name="Equation" r:id="rId5" imgW="647640" imgH="634680" progId="Equation.DSMT4">
+                <p:oleObj spid="_x0000_s6394" name="Equation" r:id="rId5" imgW="647640" imgH="634680" progId="Equation.DSMT4">
                   <p:embed/>
                 </p:oleObj>
               </mc:Choice>
@@ -6523,7 +6759,7 @@
           <a:graphicData uri="http://schemas.openxmlformats.org/presentationml/2006/ole">
             <mc:AlternateContent xmlns:mc="http://schemas.openxmlformats.org/markup-compatibility/2006">
               <mc:Choice xmlns:v="urn:schemas-microsoft-com:vml" Requires="v">
-                <p:oleObj spid="_x0000_s6375" name="Equation" r:id="rId7" imgW="596880" imgH="507960" progId="Equation.DSMT4">
+                <p:oleObj spid="_x0000_s6395" name="Equation" r:id="rId7" imgW="596880" imgH="507960" progId="Equation.DSMT4">
                   <p:embed/>
                 </p:oleObj>
               </mc:Choice>
@@ -6580,7 +6816,7 @@
           <a:graphicData uri="http://schemas.openxmlformats.org/presentationml/2006/ole">
             <mc:AlternateContent xmlns:mc="http://schemas.openxmlformats.org/markup-compatibility/2006">
               <mc:Choice xmlns:v="urn:schemas-microsoft-com:vml" Requires="v">
-                <p:oleObj spid="_x0000_s6376" name="Equation" r:id="rId9" imgW="749160" imgH="444240" progId="Equation.DSMT4">
+                <p:oleObj spid="_x0000_s6396" name="Equation" r:id="rId9" imgW="749160" imgH="444240" progId="Equation.DSMT4">
                   <p:embed/>
                 </p:oleObj>
               </mc:Choice>
@@ -6637,7 +6873,7 @@
           <a:graphicData uri="http://schemas.openxmlformats.org/presentationml/2006/ole">
             <mc:AlternateContent xmlns:mc="http://schemas.openxmlformats.org/markup-compatibility/2006">
               <mc:Choice xmlns:v="urn:schemas-microsoft-com:vml" Requires="v">
-                <p:oleObj spid="_x0000_s6377" name="Equation" r:id="rId11" imgW="1117440" imgH="482400" progId="Equation.DSMT4">
+                <p:oleObj spid="_x0000_s6397" name="Equation" r:id="rId11" imgW="1117440" imgH="482400" progId="Equation.DSMT4">
                   <p:embed/>
                 </p:oleObj>
               </mc:Choice>
@@ -6819,7 +7055,7 @@
           <a:graphicData uri="http://schemas.openxmlformats.org/presentationml/2006/ole">
             <mc:AlternateContent xmlns:mc="http://schemas.openxmlformats.org/markup-compatibility/2006">
               <mc:Choice xmlns:v="urn:schemas-microsoft-com:vml" Requires="v">
-                <p:oleObj spid="_x0000_s7261" name="Equation" r:id="rId3" imgW="736560" imgH="342720" progId="Equation.DSMT4">
+                <p:oleObj spid="_x0000_s7269" name="Equation" r:id="rId3" imgW="736560" imgH="342720" progId="Equation.DSMT4">
                   <p:embed/>
                 </p:oleObj>
               </mc:Choice>
@@ -6876,7 +7112,7 @@
           <a:graphicData uri="http://schemas.openxmlformats.org/presentationml/2006/ole">
             <mc:AlternateContent xmlns:mc="http://schemas.openxmlformats.org/markup-compatibility/2006">
               <mc:Choice xmlns:v="urn:schemas-microsoft-com:vml" Requires="v">
-                <p:oleObj spid="_x0000_s7262" name="Equation" r:id="rId5" imgW="799920" imgH="444240" progId="Equation.DSMT4">
+                <p:oleObj spid="_x0000_s7270" name="Equation" r:id="rId5" imgW="799920" imgH="444240" progId="Equation.DSMT4">
                   <p:embed/>
                 </p:oleObj>
               </mc:Choice>
@@ -6995,7 +7231,11 @@
           <a:p>
             <a:r>
               <a:rPr lang="en-US" dirty="0" smtClean="0"/>
-              <a:t>Optimum PTS: for every symbol, one needs to scan all possible combinations of the M coefficients and all possible values of those coefficients- impractical</a:t>
+              <a:t>Optimum </a:t>
+            </a:r>
+            <a:r>
+              <a:rPr lang="en-US" dirty="0" smtClean="0"/>
+              <a:t>PTS: for every symbol, one needs to scan all possible combinations of the M coefficients and all possible values of those coefficients- impractical</a:t>
             </a:r>
           </a:p>
           <a:p>
@@ -7044,11 +7284,7 @@
             <a:pPr lvl="1"/>
             <a:r>
               <a:rPr lang="en-US" dirty="0" smtClean="0"/>
-              <a:t>Typical values of PTS coefficients</a:t>
-            </a:r>
-            <a:r>
-              <a:rPr lang="en-US" dirty="0" smtClean="0"/>
-              <a:t>:</a:t>
+              <a:t>Typical values of PTS coefficients:</a:t>
             </a:r>
           </a:p>
           <a:p>
@@ -7061,7 +7297,6 @@
               <a:rPr lang="en-US" dirty="0" smtClean="0"/>
               <a:t>Example:  </a:t>
             </a:r>
-            <a:endParaRPr lang="en-US" dirty="0" smtClean="0"/>
           </a:p>
           <a:p>
             <a:pPr lvl="1"/>
@@ -7098,7 +7333,7 @@
           <a:graphicData uri="http://schemas.openxmlformats.org/presentationml/2006/ole">
             <mc:AlternateContent xmlns:mc="http://schemas.openxmlformats.org/markup-compatibility/2006">
               <mc:Choice xmlns:v="urn:schemas-microsoft-com:vml" Requires="v">
-                <p:oleObj spid="_x0000_s9304" name="Equation" r:id="rId3" imgW="1257120" imgH="253800" progId="Equation.DSMT4">
+                <p:oleObj spid="_x0000_s9312" name="Equation" r:id="rId3" imgW="1257120" imgH="253800" progId="Equation.DSMT4">
                   <p:embed/>
                 </p:oleObj>
               </mc:Choice>
@@ -7155,7 +7390,7 @@
           <a:graphicData uri="http://schemas.openxmlformats.org/presentationml/2006/ole">
             <mc:AlternateContent xmlns:mc="http://schemas.openxmlformats.org/markup-compatibility/2006">
               <mc:Choice xmlns:v="urn:schemas-microsoft-com:vml" Requires="v">
-                <p:oleObj spid="_x0000_s9305" name="Equation" r:id="rId5" imgW="952200" imgH="533160" progId="Equation.DSMT4">
+                <p:oleObj spid="_x0000_s9313" name="Equation" r:id="rId5" imgW="952200" imgH="533160" progId="Equation.DSMT4">
                   <p:embed/>
                 </p:oleObj>
               </mc:Choice>
@@ -7339,8 +7574,13 @@
             </a:pPr>
             <a:r>
               <a:rPr lang="en-US" dirty="0" smtClean="0"/>
-              <a:t>Repeat step 2 for m=3,…,M-1</a:t>
-            </a:r>
+              <a:t>Repeat step 2 for m=3,…,</a:t>
+            </a:r>
+            <a:r>
+              <a:rPr lang="en-US" dirty="0" smtClean="0"/>
+              <a:t>M</a:t>
+            </a:r>
+            <a:endParaRPr lang="en-US" dirty="0" smtClean="0"/>
           </a:p>
           <a:p>
             <a:pPr marL="514350" indent="-514350">
@@ -7712,7 +7952,15 @@
             </a:r>
             <a:r>
               <a:rPr lang="en-US" sz="3000" dirty="0"/>
-              <a:t> the ideal PTS, yet with reduced complexity</a:t>
+              <a:t> the </a:t>
+            </a:r>
+            <a:r>
+              <a:rPr lang="en-US" sz="3000" dirty="0" smtClean="0"/>
+              <a:t>optimum </a:t>
+            </a:r>
+            <a:r>
+              <a:rPr lang="en-US" sz="3000" dirty="0"/>
+              <a:t>PTS, yet with reduced complexity</a:t>
             </a:r>
           </a:p>
           <a:p>
@@ -8139,7 +8387,7 @@
         <p:spPr>
           <a:xfrm>
             <a:off x="2804160" y="6008510"/>
-            <a:ext cx="1242071" cy="369332"/>
+            <a:ext cx="1465466" cy="369332"/>
           </a:xfrm>
           <a:prstGeom prst="rect">
             <a:avLst/>
@@ -8158,7 +8406,7 @@
                   <a:srgbClr val="FF0000"/>
                 </a:solidFill>
               </a:rPr>
-              <a:t>PTS Classic </a:t>
+              <a:t>Optimum PTS</a:t>
             </a:r>
             <a:endParaRPr lang="en-US" dirty="0">
               <a:solidFill>
@@ -8761,7 +9009,7 @@
         </p:nvSpPr>
         <p:spPr>
           <a:xfrm>
-            <a:off x="411640" y="4724400"/>
+            <a:off x="3352960" y="5154255"/>
             <a:ext cx="853119" cy="369332"/>
           </a:xfrm>
           <a:prstGeom prst="rect">
@@ -8794,13 +9042,53 @@
       <p:cxnSp>
         <p:nvCxnSpPr>
           <p:cNvPr id="7" name="Straight Arrow Connector 6"/>
-          <p:cNvCxnSpPr/>
+          <p:cNvCxnSpPr>
+            <a:stCxn id="5" idx="0"/>
+          </p:cNvCxnSpPr>
+          <p:nvPr/>
+        </p:nvCxnSpPr>
+        <p:spPr>
+          <a:xfrm flipH="1" flipV="1">
+            <a:off x="3053080" y="4500880"/>
+            <a:ext cx="726440" cy="653375"/>
+          </a:xfrm>
+          <a:prstGeom prst="straightConnector1">
+            <a:avLst/>
+          </a:prstGeom>
+          <a:ln>
+            <a:solidFill>
+              <a:srgbClr val="FF0000"/>
+            </a:solidFill>
+            <a:tailEnd type="triangle"/>
+          </a:ln>
+        </p:spPr>
+        <p:style>
+          <a:lnRef idx="1">
+            <a:schemeClr val="accent1"/>
+          </a:lnRef>
+          <a:fillRef idx="0">
+            <a:schemeClr val="accent1"/>
+          </a:fillRef>
+          <a:effectRef idx="0">
+            <a:schemeClr val="accent1"/>
+          </a:effectRef>
+          <a:fontRef idx="minor">
+            <a:schemeClr val="tx1"/>
+          </a:fontRef>
+        </p:style>
+      </p:cxnSp>
+      <p:cxnSp>
+        <p:nvCxnSpPr>
+          <p:cNvPr id="9" name="Straight Arrow Connector 8"/>
+          <p:cNvCxnSpPr>
+            <a:stCxn id="5" idx="0"/>
+          </p:cNvCxnSpPr>
           <p:nvPr/>
         </p:nvCxnSpPr>
         <p:spPr>
           <a:xfrm flipV="1">
-            <a:off x="1280160" y="4384040"/>
-            <a:ext cx="1046480" cy="533400"/>
+            <a:off x="3779520" y="4001294"/>
+            <a:ext cx="926295" cy="1152961"/>
           </a:xfrm>
           <a:prstGeom prst="straightConnector1">
             <a:avLst/>
@@ -9322,7 +9610,12 @@
             <p:ph idx="1"/>
           </p:nvPr>
         </p:nvSpPr>
-        <p:spPr/>
+        <p:spPr>
+          <a:xfrm>
+            <a:off x="838200" y="1825625"/>
+            <a:ext cx="10515600" cy="4842804"/>
+          </a:xfrm>
+        </p:spPr>
         <p:txBody>
           <a:bodyPr>
             <a:normAutofit fontScale="85000" lnSpcReduction="20000"/>
@@ -9335,8 +9628,36 @@
               </a:spcBef>
             </a:pPr>
             <a:r>
+              <a:rPr lang="en-US" sz="2600" dirty="0"/>
+              <a:t>Iterative flipping algorithm</a:t>
+            </a:r>
+            <a:r>
               <a:rPr lang="en-US" sz="2600" dirty="0" smtClean="0"/>
-              <a:t>Reduced Complexity algorithm: </a:t>
+              <a:t>:</a:t>
+            </a:r>
+          </a:p>
+          <a:p>
+            <a:pPr marL="0" lvl="1" indent="0">
+              <a:spcBef>
+                <a:spcPts val="1000"/>
+              </a:spcBef>
+              <a:buNone/>
+            </a:pPr>
+            <a:endParaRPr lang="en-US" sz="2600" dirty="0" smtClean="0"/>
+          </a:p>
+          <a:p>
+            <a:pPr marL="228600" lvl="1">
+              <a:spcBef>
+                <a:spcPts val="1000"/>
+              </a:spcBef>
+            </a:pPr>
+            <a:r>
+              <a:rPr lang="en-US" sz="2600" dirty="0" smtClean="0"/>
+              <a:t>Reduced </a:t>
+            </a:r>
+            <a:r>
+              <a:rPr lang="en-US" sz="2600" dirty="0" smtClean="0"/>
+              <a:t>Complexity algorithm: </a:t>
             </a:r>
             <a:r>
               <a:rPr lang="en-US" sz="2600" dirty="0"/>
@@ -9367,11 +9688,7 @@
             </a:r>
             <a:r>
               <a:rPr lang="en-US" sz="2600" dirty="0"/>
-              <a:t>choose </a:t>
-            </a:r>
-            <a:r>
-              <a:rPr lang="en-US" sz="2600" dirty="0"/>
-              <a:t>r</a:t>
+              <a:t>choose r</a:t>
             </a:r>
             <a:r>
               <a:rPr lang="en-US" sz="2600" dirty="0" smtClean="0"/>
@@ -9449,21 +9766,6 @@
                 <a:spcPts val="1000"/>
               </a:spcBef>
             </a:pPr>
-            <a:r>
-              <a:rPr lang="en-US" sz="2600" dirty="0"/>
-              <a:t>Iterative </a:t>
-            </a:r>
-            <a:r>
-              <a:rPr lang="en-US" sz="2600" dirty="0" smtClean="0"/>
-              <a:t>flipping algorithm:</a:t>
-            </a:r>
-          </a:p>
-          <a:p>
-            <a:pPr marL="228600" lvl="1">
-              <a:spcBef>
-                <a:spcPts val="1000"/>
-              </a:spcBef>
-            </a:pPr>
             <a:endParaRPr lang="en-US" sz="2600" dirty="0"/>
           </a:p>
           <a:p>
@@ -9513,20 +9815,20 @@
           <p:nvPr>
             <p:extLst>
               <p:ext uri="{D42A27DB-BD31-4B8C-83A1-F6EECF244321}">
-                <p14:modId xmlns:p14="http://schemas.microsoft.com/office/powerpoint/2010/main" val="2943440975"/>
+                <p14:modId xmlns:p14="http://schemas.microsoft.com/office/powerpoint/2010/main" val="2607092665"/>
               </p:ext>
             </p:extLst>
           </p:nvPr>
         </p:nvGraphicFramePr>
         <p:xfrm>
-          <a:off x="3195638" y="2874963"/>
+          <a:off x="3182144" y="3830174"/>
           <a:ext cx="2379662" cy="1127125"/>
         </p:xfrm>
         <a:graphic>
           <a:graphicData uri="http://schemas.openxmlformats.org/presentationml/2006/ole">
             <mc:AlternateContent xmlns:mc="http://schemas.openxmlformats.org/markup-compatibility/2006">
               <mc:Choice xmlns:v="urn:schemas-microsoft-com:vml" Requires="v">
-                <p:oleObj spid="_x0000_s11336" name="Equation" r:id="rId3" imgW="965160" imgH="457200" progId="Equation.DSMT4">
+                <p:oleObj spid="_x0000_s11346" name="Equation" r:id="rId3" imgW="965160" imgH="457200" progId="Equation.DSMT4">
                   <p:embed/>
                 </p:oleObj>
               </mc:Choice>
@@ -9547,7 +9849,7 @@
                     </p:blipFill>
                     <p:spPr>
                       <a:xfrm>
-                        <a:off x="3195638" y="2874963"/>
+                        <a:off x="3182144" y="3830174"/>
                         <a:ext cx="2379662" cy="1127125"/>
                       </a:xfrm>
                       <a:prstGeom prst="rect">
@@ -9570,20 +9872,20 @@
           <p:nvPr>
             <p:extLst>
               <p:ext uri="{D42A27DB-BD31-4B8C-83A1-F6EECF244321}">
-                <p14:modId xmlns:p14="http://schemas.microsoft.com/office/powerpoint/2010/main" val="2680838180"/>
+                <p14:modId xmlns:p14="http://schemas.microsoft.com/office/powerpoint/2010/main" val="148684883"/>
               </p:ext>
             </p:extLst>
           </p:nvPr>
         </p:nvGraphicFramePr>
         <p:xfrm>
-          <a:off x="4371975" y="4136231"/>
+          <a:off x="4371975" y="1796158"/>
           <a:ext cx="1724025" cy="500063"/>
         </p:xfrm>
         <a:graphic>
           <a:graphicData uri="http://schemas.openxmlformats.org/presentationml/2006/ole">
             <mc:AlternateContent xmlns:mc="http://schemas.openxmlformats.org/markup-compatibility/2006">
               <mc:Choice xmlns:v="urn:schemas-microsoft-com:vml" Requires="v">
-                <p:oleObj spid="_x0000_s11337" name="Equation" r:id="rId5" imgW="698400" imgH="203040" progId="Equation.DSMT4">
+                <p:oleObj spid="_x0000_s11347" name="Equation" r:id="rId5" imgW="698400" imgH="203040" progId="Equation.DSMT4">
                   <p:embed/>
                 </p:oleObj>
               </mc:Choice>
@@ -9604,7 +9906,7 @@
                     </p:blipFill>
                     <p:spPr>
                       <a:xfrm>
-                        <a:off x="4371975" y="4136231"/>
+                        <a:off x="4371975" y="1796158"/>
                         <a:ext cx="1724025" cy="500063"/>
                       </a:xfrm>
                       <a:prstGeom prst="rect">
@@ -10192,83 +10494,7 @@
   <p:timing>
     <p:tnLst>
       <p:par>
-        <p:cTn id="1" dur="indefinite" restart="never" nodeType="tmRoot">
-          <p:childTnLst>
-            <p:seq concurrent="1" nextAc="seek">
-              <p:cTn id="2" dur="indefinite" nodeType="mainSeq">
-                <p:childTnLst>
-                  <p:par>
-                    <p:cTn id="3" fill="hold">
-                      <p:stCondLst>
-                        <p:cond delay="indefinite"/>
-                      </p:stCondLst>
-                      <p:childTnLst>
-                        <p:par>
-                          <p:cTn id="4" fill="hold">
-                            <p:stCondLst>
-                              <p:cond delay="0"/>
-                            </p:stCondLst>
-                            <p:childTnLst>
-                              <p:par>
-                                <p:cTn id="5" presetID="10" presetClass="entr" presetSubtype="0" fill="hold" nodeType="clickEffect">
-                                  <p:stCondLst>
-                                    <p:cond delay="0"/>
-                                  </p:stCondLst>
-                                  <p:childTnLst>
-                                    <p:set>
-                                      <p:cBhvr>
-                                        <p:cTn id="6" dur="1" fill="hold">
-                                          <p:stCondLst>
-                                            <p:cond delay="0"/>
-                                          </p:stCondLst>
-                                        </p:cTn>
-                                        <p:tgtEl>
-                                          <p:spTgt spid="4"/>
-                                        </p:tgtEl>
-                                        <p:attrNameLst>
-                                          <p:attrName>style.visibility</p:attrName>
-                                        </p:attrNameLst>
-                                      </p:cBhvr>
-                                      <p:to>
-                                        <p:strVal val="visible"/>
-                                      </p:to>
-                                    </p:set>
-                                    <p:animEffect transition="in" filter="fade">
-                                      <p:cBhvr>
-                                        <p:cTn id="7" dur="500"/>
-                                        <p:tgtEl>
-                                          <p:spTgt spid="4"/>
-                                        </p:tgtEl>
-                                      </p:cBhvr>
-                                    </p:animEffect>
-                                  </p:childTnLst>
-                                </p:cTn>
-                              </p:par>
-                            </p:childTnLst>
-                          </p:cTn>
-                        </p:par>
-                      </p:childTnLst>
-                    </p:cTn>
-                  </p:par>
-                </p:childTnLst>
-              </p:cTn>
-              <p:prevCondLst>
-                <p:cond evt="onPrev" delay="0">
-                  <p:tgtEl>
-                    <p:sldTgt/>
-                  </p:tgtEl>
-                </p:cond>
-              </p:prevCondLst>
-              <p:nextCondLst>
-                <p:cond evt="onNext" delay="0">
-                  <p:tgtEl>
-                    <p:sldTgt/>
-                  </p:tgtEl>
-                </p:cond>
-              </p:nextCondLst>
-            </p:seq>
-          </p:childTnLst>
-        </p:cTn>
+        <p:cTn id="1" dur="indefinite" restart="never" nodeType="tmRoot"/>
       </p:par>
     </p:tnLst>
   </p:timing>
@@ -10881,7 +11107,7 @@
           <a:graphicData uri="http://schemas.openxmlformats.org/presentationml/2006/ole">
             <mc:AlternateContent xmlns:mc="http://schemas.openxmlformats.org/markup-compatibility/2006">
               <mc:Choice xmlns:v="urn:schemas-microsoft-com:vml" Requires="v">
-                <p:oleObj spid="_x0000_s1091" name="Equation" r:id="rId4" imgW="1562040" imgH="444240" progId="Equation.DSMT4">
+                <p:oleObj spid="_x0000_s1095" name="Equation" r:id="rId4" imgW="1562040" imgH="444240" progId="Equation.DSMT4">
                   <p:embed/>
                 </p:oleObj>
               </mc:Choice>
@@ -10929,83 +11155,7 @@
   <p:timing>
     <p:tnLst>
       <p:par>
-        <p:cTn id="1" dur="indefinite" restart="never" nodeType="tmRoot">
-          <p:childTnLst>
-            <p:seq concurrent="1" nextAc="seek">
-              <p:cTn id="2" dur="indefinite" nodeType="mainSeq">
-                <p:childTnLst>
-                  <p:par>
-                    <p:cTn id="3" fill="hold">
-                      <p:stCondLst>
-                        <p:cond delay="indefinite"/>
-                      </p:stCondLst>
-                      <p:childTnLst>
-                        <p:par>
-                          <p:cTn id="4" fill="hold">
-                            <p:stCondLst>
-                              <p:cond delay="0"/>
-                            </p:stCondLst>
-                            <p:childTnLst>
-                              <p:par>
-                                <p:cTn id="5" presetID="10" presetClass="entr" presetSubtype="0" fill="hold" nodeType="clickEffect">
-                                  <p:stCondLst>
-                                    <p:cond delay="0"/>
-                                  </p:stCondLst>
-                                  <p:childTnLst>
-                                    <p:set>
-                                      <p:cBhvr>
-                                        <p:cTn id="6" dur="1" fill="hold">
-                                          <p:stCondLst>
-                                            <p:cond delay="0"/>
-                                          </p:stCondLst>
-                                        </p:cTn>
-                                        <p:tgtEl>
-                                          <p:spTgt spid="4"/>
-                                        </p:tgtEl>
-                                        <p:attrNameLst>
-                                          <p:attrName>style.visibility</p:attrName>
-                                        </p:attrNameLst>
-                                      </p:cBhvr>
-                                      <p:to>
-                                        <p:strVal val="visible"/>
-                                      </p:to>
-                                    </p:set>
-                                    <p:animEffect transition="in" filter="fade">
-                                      <p:cBhvr>
-                                        <p:cTn id="7" dur="500"/>
-                                        <p:tgtEl>
-                                          <p:spTgt spid="4"/>
-                                        </p:tgtEl>
-                                      </p:cBhvr>
-                                    </p:animEffect>
-                                  </p:childTnLst>
-                                </p:cTn>
-                              </p:par>
-                            </p:childTnLst>
-                          </p:cTn>
-                        </p:par>
-                      </p:childTnLst>
-                    </p:cTn>
-                  </p:par>
-                </p:childTnLst>
-              </p:cTn>
-              <p:prevCondLst>
-                <p:cond evt="onPrev" delay="0">
-                  <p:tgtEl>
-                    <p:sldTgt/>
-                  </p:tgtEl>
-                </p:cond>
-              </p:prevCondLst>
-              <p:nextCondLst>
-                <p:cond evt="onNext" delay="0">
-                  <p:tgtEl>
-                    <p:sldTgt/>
-                  </p:tgtEl>
-                </p:cond>
-              </p:nextCondLst>
-            </p:seq>
-          </p:childTnLst>
-        </p:cTn>
+        <p:cTn id="1" dur="indefinite" restart="never" nodeType="tmRoot"/>
       </p:par>
     </p:tnLst>
   </p:timing>
@@ -11434,11 +11584,7 @@
           <a:p>
             <a:r>
               <a:rPr lang="en-US" dirty="0" smtClean="0"/>
-              <a:t>Block partitioning </a:t>
-            </a:r>
-            <a:r>
-              <a:rPr lang="en-US" dirty="0" smtClean="0"/>
-              <a:t>method</a:t>
+              <a:t>Block partitioning method</a:t>
             </a:r>
             <a:endParaRPr lang="en-US" dirty="0"/>
           </a:p>
@@ -11838,17 +11984,23 @@
           <p:cNvGraphicFramePr>
             <a:graphicFrameLocks noChangeAspect="1"/>
           </p:cNvGraphicFramePr>
-          <p:nvPr/>
+          <p:nvPr>
+            <p:extLst>
+              <p:ext uri="{D42A27DB-BD31-4B8C-83A1-F6EECF244321}">
+                <p14:modId xmlns:p14="http://schemas.microsoft.com/office/powerpoint/2010/main" val="2568032202"/>
+              </p:ext>
+            </p:extLst>
+          </p:nvPr>
         </p:nvGraphicFramePr>
         <p:xfrm>
-          <a:off x="4466513" y="1825625"/>
+          <a:off x="4355001" y="1584116"/>
           <a:ext cx="2971516" cy="845553"/>
         </p:xfrm>
         <a:graphic>
           <a:graphicData uri="http://schemas.openxmlformats.org/presentationml/2006/ole">
             <mc:AlternateContent xmlns:mc="http://schemas.openxmlformats.org/markup-compatibility/2006">
               <mc:Choice xmlns:v="urn:schemas-microsoft-com:vml" Requires="v">
-                <p:oleObj spid="_x0000_s4158" name="Equation" r:id="rId4" imgW="1562040" imgH="444240" progId="Equation.DSMT4">
+                <p:oleObj spid="_x0000_s4162" name="Equation" r:id="rId4" imgW="1562040" imgH="444240" progId="Equation.DSMT4">
                   <p:embed/>
                 </p:oleObj>
               </mc:Choice>
@@ -11869,7 +12021,7 @@
                     </p:blipFill>
                     <p:spPr>
                       <a:xfrm>
-                        <a:off x="4466513" y="1825625"/>
+                        <a:off x="4355001" y="1584116"/>
                         <a:ext cx="2971516" cy="845553"/>
                       </a:xfrm>
                       <a:prstGeom prst="rect">
@@ -12027,17 +12179,21 @@
           <a:p>
             <a:r>
               <a:rPr lang="en-US" dirty="0" smtClean="0"/>
-              <a:t>Increasing</a:t>
-            </a:r>
-            <a:r>
-              <a:rPr lang="en-US" dirty="0" smtClean="0"/>
-              <a:t> PA’s compression point increases power consumption</a:t>
-            </a:r>
-          </a:p>
-          <a:p>
-            <a:r>
-              <a:rPr lang="en-US" dirty="0" smtClean="0"/>
-              <a:t>Not saturation nor Increasing: compromise on </a:t>
+              <a:t>Increasing PA’s compression point increases power consumption</a:t>
+            </a:r>
+          </a:p>
+          <a:p>
+            <a:r>
+              <a:rPr lang="en-US" dirty="0" smtClean="0"/>
+              <a:t>Not </a:t>
+            </a:r>
+            <a:r>
+              <a:rPr lang="en-US" dirty="0" smtClean="0"/>
+              <a:t>saturating </a:t>
+            </a:r>
+            <a:r>
+              <a:rPr lang="en-US" dirty="0" smtClean="0"/>
+              <a:t>nor Increasing: compromise on </a:t>
             </a:r>
             <a:r>
               <a:rPr lang="en-US" dirty="0" err="1" smtClean="0"/>
@@ -12060,7 +12216,7 @@
           <p:nvPr/>
         </p:nvPicPr>
         <p:blipFill>
-          <a:blip r:embed="rId2"/>
+          <a:blip r:embed="rId3"/>
           <a:stretch>
             <a:fillRect/>
           </a:stretch>
@@ -12242,7 +12398,7 @@
           <a:graphicData uri="http://schemas.openxmlformats.org/presentationml/2006/ole">
             <mc:AlternateContent xmlns:mc="http://schemas.openxmlformats.org/markup-compatibility/2006">
               <mc:Choice xmlns:v="urn:schemas-microsoft-com:vml" Requires="v">
-                <p:oleObj spid="_x0000_s12302" name="Equation" r:id="rId3" imgW="1892160" imgH="761760" progId="Equation.DSMT4">
+                <p:oleObj spid="_x0000_s12306" name="Equation" r:id="rId3" imgW="1892160" imgH="761760" progId="Equation.DSMT4">
                   <p:embed/>
                 </p:oleObj>
               </mc:Choice>
@@ -12438,25 +12594,25 @@
           <p:nvPr>
             <p:extLst>
               <p:ext uri="{D42A27DB-BD31-4B8C-83A1-F6EECF244321}">
-                <p14:modId xmlns:p14="http://schemas.microsoft.com/office/powerpoint/2010/main" val="2733865391"/>
+                <p14:modId xmlns:p14="http://schemas.microsoft.com/office/powerpoint/2010/main" val="3876740824"/>
               </p:ext>
             </p:extLst>
           </p:nvPr>
         </p:nvGraphicFramePr>
         <p:xfrm>
-          <a:off x="3401443" y="2364259"/>
+          <a:off x="5033168" y="1834562"/>
           <a:ext cx="2125663" cy="555625"/>
         </p:xfrm>
         <a:graphic>
           <a:graphicData uri="http://schemas.openxmlformats.org/presentationml/2006/ole">
             <mc:AlternateContent xmlns:mc="http://schemas.openxmlformats.org/markup-compatibility/2006">
               <mc:Choice xmlns:v="urn:schemas-microsoft-com:vml" Requires="v">
-                <p:oleObj spid="_x0000_s5308" name="Equation" r:id="rId3" imgW="1117440" imgH="291960" progId="Equation.DSMT4">
+                <p:oleObj spid="_x0000_s5320" name="Equation" r:id="rId4" imgW="1117440" imgH="291960" progId="Equation.DSMT4">
                   <p:embed/>
                 </p:oleObj>
               </mc:Choice>
               <mc:Fallback>
-                <p:oleObj name="Equation" r:id="rId3" imgW="1117440" imgH="291960" progId="Equation.DSMT4">
+                <p:oleObj name="Equation" r:id="rId4" imgW="1117440" imgH="291960" progId="Equation.DSMT4">
                   <p:embed/>
                   <p:pic>
                     <p:nvPicPr>
@@ -12465,14 +12621,14 @@
                       <p:nvPr/>
                     </p:nvPicPr>
                     <p:blipFill>
-                      <a:blip r:embed="rId4"/>
+                      <a:blip r:embed="rId5"/>
                       <a:stretch>
                         <a:fillRect/>
                       </a:stretch>
                     </p:blipFill>
                     <p:spPr>
                       <a:xfrm>
-                        <a:off x="3401443" y="2364259"/>
+                        <a:off x="5033168" y="1834562"/>
                         <a:ext cx="2125663" cy="555625"/>
                       </a:xfrm>
                       <a:prstGeom prst="rect">
@@ -12495,25 +12651,25 @@
           <p:nvPr>
             <p:extLst>
               <p:ext uri="{D42A27DB-BD31-4B8C-83A1-F6EECF244321}">
-                <p14:modId xmlns:p14="http://schemas.microsoft.com/office/powerpoint/2010/main" val="1681872489"/>
+                <p14:modId xmlns:p14="http://schemas.microsoft.com/office/powerpoint/2010/main" val="2110999083"/>
               </p:ext>
             </p:extLst>
           </p:nvPr>
         </p:nvGraphicFramePr>
         <p:xfrm>
-          <a:off x="3401443" y="3566319"/>
+          <a:off x="6624145" y="3131344"/>
           <a:ext cx="3090863" cy="869950"/>
         </p:xfrm>
         <a:graphic>
           <a:graphicData uri="http://schemas.openxmlformats.org/presentationml/2006/ole">
             <mc:AlternateContent xmlns:mc="http://schemas.openxmlformats.org/markup-compatibility/2006">
               <mc:Choice xmlns:v="urn:schemas-microsoft-com:vml" Requires="v">
-                <p:oleObj spid="_x0000_s5309" name="Equation" r:id="rId5" imgW="1625400" imgH="457200" progId="Equation.DSMT4">
+                <p:oleObj spid="_x0000_s5321" name="Equation" r:id="rId6" imgW="1625400" imgH="457200" progId="Equation.DSMT4">
                   <p:embed/>
                 </p:oleObj>
               </mc:Choice>
               <mc:Fallback>
-                <p:oleObj name="Equation" r:id="rId5" imgW="1625400" imgH="457200" progId="Equation.DSMT4">
+                <p:oleObj name="Equation" r:id="rId6" imgW="1625400" imgH="457200" progId="Equation.DSMT4">
                   <p:embed/>
                   <p:pic>
                     <p:nvPicPr>
@@ -12522,14 +12678,14 @@
                       <p:nvPr/>
                     </p:nvPicPr>
                     <p:blipFill>
-                      <a:blip r:embed="rId6"/>
+                      <a:blip r:embed="rId7"/>
                       <a:stretch>
                         <a:fillRect/>
                       </a:stretch>
                     </p:blipFill>
                     <p:spPr>
                       <a:xfrm>
-                        <a:off x="3401443" y="3566319"/>
+                        <a:off x="6624145" y="3131344"/>
                         <a:ext cx="3090863" cy="869950"/>
                       </a:xfrm>
                       <a:prstGeom prst="rect">
@@ -12552,25 +12708,25 @@
           <p:nvPr>
             <p:extLst>
               <p:ext uri="{D42A27DB-BD31-4B8C-83A1-F6EECF244321}">
-                <p14:modId xmlns:p14="http://schemas.microsoft.com/office/powerpoint/2010/main" val="61900692"/>
+                <p14:modId xmlns:p14="http://schemas.microsoft.com/office/powerpoint/2010/main" val="3641245023"/>
               </p:ext>
             </p:extLst>
           </p:nvPr>
         </p:nvGraphicFramePr>
         <p:xfrm>
-          <a:off x="2425700" y="4605312"/>
+          <a:off x="2425700" y="4215019"/>
           <a:ext cx="3670300" cy="942975"/>
         </p:xfrm>
         <a:graphic>
           <a:graphicData uri="http://schemas.openxmlformats.org/presentationml/2006/ole">
             <mc:AlternateContent xmlns:mc="http://schemas.openxmlformats.org/markup-compatibility/2006">
               <mc:Choice xmlns:v="urn:schemas-microsoft-com:vml" Requires="v">
-                <p:oleObj spid="_x0000_s5310" name="Equation" r:id="rId7" imgW="1930320" imgH="495000" progId="Equation.DSMT4">
+                <p:oleObj spid="_x0000_s5322" name="Equation" r:id="rId8" imgW="1930320" imgH="495000" progId="Equation.DSMT4">
                   <p:embed/>
                 </p:oleObj>
               </mc:Choice>
               <mc:Fallback>
-                <p:oleObj name="Equation" r:id="rId7" imgW="1930320" imgH="495000" progId="Equation.DSMT4">
+                <p:oleObj name="Equation" r:id="rId8" imgW="1930320" imgH="495000" progId="Equation.DSMT4">
                   <p:embed/>
                   <p:pic>
                     <p:nvPicPr>
@@ -12579,14 +12735,14 @@
                       <p:nvPr/>
                     </p:nvPicPr>
                     <p:blipFill>
-                      <a:blip r:embed="rId8"/>
+                      <a:blip r:embed="rId9"/>
                       <a:stretch>
                         <a:fillRect/>
                       </a:stretch>
                     </p:blipFill>
                     <p:spPr>
                       <a:xfrm>
-                        <a:off x="2425700" y="4605312"/>
+                        <a:off x="2425700" y="4215019"/>
                         <a:ext cx="3670300" cy="942975"/>
                       </a:xfrm>
                       <a:prstGeom prst="rect">

</xml_diff>

<commit_message>
Thesis.docx: completed the content insertion into the document. what is let are the graphs and the editing
</commit_message>
<xml_diff>
--- a/Documents/Presentations/PAPR Reduction- PTS.pptx
+++ b/Documents/Presentations/PAPR Reduction- PTS.pptx
@@ -239,7 +239,7 @@
           <a:p>
             <a:fld id="{9D4DBBD4-50DD-45D8-920D-439F8E5106DA}" type="datetimeFigureOut">
               <a:rPr lang="en-US" smtClean="0"/>
-              <a:t>10/16/2017</a:t>
+              <a:t>12/31/2017</a:t>
             </a:fld>
             <a:endParaRPr lang="en-US"/>
           </a:p>
@@ -898,7 +898,7 @@
           <a:p>
             <a:fld id="{0FFA1DB2-F186-40A4-8E7C-447CEF618330}" type="datetimeFigureOut">
               <a:rPr lang="en-US" smtClean="0"/>
-              <a:t>10/16/2017</a:t>
+              <a:t>12/31/2017</a:t>
             </a:fld>
             <a:endParaRPr lang="en-US"/>
           </a:p>
@@ -1068,7 +1068,7 @@
           <a:p>
             <a:fld id="{0FFA1DB2-F186-40A4-8E7C-447CEF618330}" type="datetimeFigureOut">
               <a:rPr lang="en-US" smtClean="0"/>
-              <a:t>10/16/2017</a:t>
+              <a:t>12/31/2017</a:t>
             </a:fld>
             <a:endParaRPr lang="en-US"/>
           </a:p>
@@ -1248,7 +1248,7 @@
           <a:p>
             <a:fld id="{0FFA1DB2-F186-40A4-8E7C-447CEF618330}" type="datetimeFigureOut">
               <a:rPr lang="en-US" smtClean="0"/>
-              <a:t>10/16/2017</a:t>
+              <a:t>12/31/2017</a:t>
             </a:fld>
             <a:endParaRPr lang="en-US"/>
           </a:p>
@@ -1418,7 +1418,7 @@
           <a:p>
             <a:fld id="{0FFA1DB2-F186-40A4-8E7C-447CEF618330}" type="datetimeFigureOut">
               <a:rPr lang="en-US" smtClean="0"/>
-              <a:t>10/16/2017</a:t>
+              <a:t>12/31/2017</a:t>
             </a:fld>
             <a:endParaRPr lang="en-US"/>
           </a:p>
@@ -1664,7 +1664,7 @@
           <a:p>
             <a:fld id="{0FFA1DB2-F186-40A4-8E7C-447CEF618330}" type="datetimeFigureOut">
               <a:rPr lang="en-US" smtClean="0"/>
-              <a:t>10/16/2017</a:t>
+              <a:t>12/31/2017</a:t>
             </a:fld>
             <a:endParaRPr lang="en-US"/>
           </a:p>
@@ -1896,7 +1896,7 @@
           <a:p>
             <a:fld id="{0FFA1DB2-F186-40A4-8E7C-447CEF618330}" type="datetimeFigureOut">
               <a:rPr lang="en-US" smtClean="0"/>
-              <a:t>10/16/2017</a:t>
+              <a:t>12/31/2017</a:t>
             </a:fld>
             <a:endParaRPr lang="en-US"/>
           </a:p>
@@ -2263,7 +2263,7 @@
           <a:p>
             <a:fld id="{0FFA1DB2-F186-40A4-8E7C-447CEF618330}" type="datetimeFigureOut">
               <a:rPr lang="en-US" smtClean="0"/>
-              <a:t>10/16/2017</a:t>
+              <a:t>12/31/2017</a:t>
             </a:fld>
             <a:endParaRPr lang="en-US"/>
           </a:p>
@@ -2381,7 +2381,7 @@
           <a:p>
             <a:fld id="{0FFA1DB2-F186-40A4-8E7C-447CEF618330}" type="datetimeFigureOut">
               <a:rPr lang="en-US" smtClean="0"/>
-              <a:t>10/16/2017</a:t>
+              <a:t>12/31/2017</a:t>
             </a:fld>
             <a:endParaRPr lang="en-US"/>
           </a:p>
@@ -2476,7 +2476,7 @@
           <a:p>
             <a:fld id="{0FFA1DB2-F186-40A4-8E7C-447CEF618330}" type="datetimeFigureOut">
               <a:rPr lang="en-US" smtClean="0"/>
-              <a:t>10/16/2017</a:t>
+              <a:t>12/31/2017</a:t>
             </a:fld>
             <a:endParaRPr lang="en-US"/>
           </a:p>
@@ -2753,7 +2753,7 @@
           <a:p>
             <a:fld id="{0FFA1DB2-F186-40A4-8E7C-447CEF618330}" type="datetimeFigureOut">
               <a:rPr lang="en-US" smtClean="0"/>
-              <a:t>10/16/2017</a:t>
+              <a:t>12/31/2017</a:t>
             </a:fld>
             <a:endParaRPr lang="en-US"/>
           </a:p>
@@ -3006,7 +3006,7 @@
           <a:p>
             <a:fld id="{0FFA1DB2-F186-40A4-8E7C-447CEF618330}" type="datetimeFigureOut">
               <a:rPr lang="en-US" smtClean="0"/>
-              <a:t>10/16/2017</a:t>
+              <a:t>12/31/2017</a:t>
             </a:fld>
             <a:endParaRPr lang="en-US"/>
           </a:p>
@@ -3219,7 +3219,7 @@
           <a:p>
             <a:fld id="{0FFA1DB2-F186-40A4-8E7C-447CEF618330}" type="datetimeFigureOut">
               <a:rPr lang="en-US" smtClean="0"/>
-              <a:t>10/16/2017</a:t>
+              <a:t>12/31/2017</a:t>
             </a:fld>
             <a:endParaRPr lang="en-US"/>
           </a:p>
@@ -3805,7 +3805,7 @@
           <a:graphicData uri="http://schemas.openxmlformats.org/presentationml/2006/ole">
             <mc:AlternateContent xmlns:mc="http://schemas.openxmlformats.org/markup-compatibility/2006">
               <mc:Choice xmlns:v="urn:schemas-microsoft-com:vml" Requires="v">
-                <p:oleObj spid="_x0000_s3282" name="Equation" r:id="rId3" imgW="4178160" imgH="1396800" progId="Equation.DSMT4">
+                <p:oleObj spid="_x0000_s3288" name="Equation" r:id="rId3" imgW="4178160" imgH="1396800" progId="Equation.DSMT4">
                   <p:embed/>
                 </p:oleObj>
               </mc:Choice>
@@ -3862,7 +3862,7 @@
           <a:graphicData uri="http://schemas.openxmlformats.org/presentationml/2006/ole">
             <mc:AlternateContent xmlns:mc="http://schemas.openxmlformats.org/markup-compatibility/2006">
               <mc:Choice xmlns:v="urn:schemas-microsoft-com:vml" Requires="v">
-                <p:oleObj spid="_x0000_s3283" name="Equation" r:id="rId5" imgW="850680" imgH="419040" progId="Equation.DSMT4">
+                <p:oleObj spid="_x0000_s3289" name="Equation" r:id="rId5" imgW="850680" imgH="419040" progId="Equation.DSMT4">
                   <p:embed/>
                 </p:oleObj>
               </mc:Choice>
@@ -3919,7 +3919,7 @@
           <a:graphicData uri="http://schemas.openxmlformats.org/presentationml/2006/ole">
             <mc:AlternateContent xmlns:mc="http://schemas.openxmlformats.org/markup-compatibility/2006">
               <mc:Choice xmlns:v="urn:schemas-microsoft-com:vml" Requires="v">
-                <p:oleObj spid="_x0000_s3284" name="Equation" r:id="rId7" imgW="2844720" imgH="482400" progId="Equation.DSMT4">
+                <p:oleObj spid="_x0000_s3290" name="Equation" r:id="rId7" imgW="2844720" imgH="482400" progId="Equation.DSMT4">
                   <p:embed/>
                 </p:oleObj>
               </mc:Choice>
@@ -4064,7 +4064,7 @@
           <a:graphicData uri="http://schemas.openxmlformats.org/presentationml/2006/ole">
             <mc:AlternateContent xmlns:mc="http://schemas.openxmlformats.org/markup-compatibility/2006">
               <mc:Choice xmlns:v="urn:schemas-microsoft-com:vml" Requires="v">
-                <p:oleObj spid="_x0000_s13323" name="Equation" r:id="rId4" imgW="2412720" imgH="304560" progId="Equation.DSMT4">
+                <p:oleObj spid="_x0000_s13325" name="Equation" r:id="rId4" imgW="2412720" imgH="304560" progId="Equation.DSMT4">
                   <p:embed/>
                 </p:oleObj>
               </mc:Choice>
@@ -4210,15 +4210,7 @@
             </a:r>
             <a:r>
               <a:rPr lang="en-US" dirty="0" smtClean="0"/>
-              <a:t>n interpolated N-samples symbol has effectively the </a:t>
-            </a:r>
-            <a:r>
-              <a:rPr lang="en-US" dirty="0" smtClean="0"/>
-              <a:t>non-interpolated theoretical </a:t>
-            </a:r>
-            <a:r>
-              <a:rPr lang="en-US" dirty="0" smtClean="0"/>
-              <a:t>PAPR of a 2N-samples symbol </a:t>
+              <a:t>n interpolated N-samples symbol has effectively the non-interpolated theoretical PAPR of a 2N-samples symbol </a:t>
             </a:r>
             <a:endParaRPr lang="en-US" dirty="0"/>
           </a:p>
@@ -4662,49 +4654,49 @@
                 <a:gridCol w="1641805">
                   <a:extLst>
                     <a:ext uri="{9D8B030D-6E8A-4147-A177-3AD203B41FA5}">
-                      <a16:colId xmlns:a16="http://schemas.microsoft.com/office/drawing/2014/main" val="20000"/>
+                      <a16:colId xmlns:a16="http://schemas.microsoft.com/office/drawing/2014/main" xmlns="" val="20000"/>
                     </a:ext>
                   </a:extLst>
                 </a:gridCol>
                 <a:gridCol w="1641805">
                   <a:extLst>
                     <a:ext uri="{9D8B030D-6E8A-4147-A177-3AD203B41FA5}">
-                      <a16:colId xmlns:a16="http://schemas.microsoft.com/office/drawing/2014/main" val="20001"/>
+                      <a16:colId xmlns:a16="http://schemas.microsoft.com/office/drawing/2014/main" xmlns="" val="20001"/>
                     </a:ext>
                   </a:extLst>
                 </a:gridCol>
                 <a:gridCol w="1498826">
                   <a:extLst>
                     <a:ext uri="{9D8B030D-6E8A-4147-A177-3AD203B41FA5}">
-                      <a16:colId xmlns:a16="http://schemas.microsoft.com/office/drawing/2014/main" val="20002"/>
+                      <a16:colId xmlns:a16="http://schemas.microsoft.com/office/drawing/2014/main" xmlns="" val="20002"/>
                     </a:ext>
                   </a:extLst>
                 </a:gridCol>
                 <a:gridCol w="1755202">
                   <a:extLst>
                     <a:ext uri="{9D8B030D-6E8A-4147-A177-3AD203B41FA5}">
-                      <a16:colId xmlns:a16="http://schemas.microsoft.com/office/drawing/2014/main" val="20003"/>
+                      <a16:colId xmlns:a16="http://schemas.microsoft.com/office/drawing/2014/main" xmlns="" val="20003"/>
                     </a:ext>
                   </a:extLst>
                 </a:gridCol>
                 <a:gridCol w="1203003">
                   <a:extLst>
                     <a:ext uri="{9D8B030D-6E8A-4147-A177-3AD203B41FA5}">
-                      <a16:colId xmlns:a16="http://schemas.microsoft.com/office/drawing/2014/main" val="20004"/>
+                      <a16:colId xmlns:a16="http://schemas.microsoft.com/office/drawing/2014/main" xmlns="" val="20004"/>
                     </a:ext>
                   </a:extLst>
                 </a:gridCol>
                 <a:gridCol w="1281890">
                   <a:extLst>
                     <a:ext uri="{9D8B030D-6E8A-4147-A177-3AD203B41FA5}">
-                      <a16:colId xmlns:a16="http://schemas.microsoft.com/office/drawing/2014/main" val="20005"/>
+                      <a16:colId xmlns:a16="http://schemas.microsoft.com/office/drawing/2014/main" xmlns="" val="20005"/>
                     </a:ext>
                   </a:extLst>
                 </a:gridCol>
                 <a:gridCol w="1321334">
                   <a:extLst>
                     <a:ext uri="{9D8B030D-6E8A-4147-A177-3AD203B41FA5}">
-                      <a16:colId xmlns:a16="http://schemas.microsoft.com/office/drawing/2014/main" val="20006"/>
+                      <a16:colId xmlns:a16="http://schemas.microsoft.com/office/drawing/2014/main" xmlns="" val="20006"/>
                     </a:ext>
                   </a:extLst>
                 </a:gridCol>
@@ -4884,7 +4876,7 @@
                 </a:tc>
                 <a:extLst>
                   <a:ext uri="{0D108BD9-81ED-4DB2-BD59-A6C34878D82A}">
-                    <a16:rowId xmlns:a16="http://schemas.microsoft.com/office/drawing/2014/main" val="10000"/>
+                    <a16:rowId xmlns:a16="http://schemas.microsoft.com/office/drawing/2014/main" xmlns="" val="10000"/>
                   </a:ext>
                 </a:extLst>
               </a:tr>
@@ -5052,7 +5044,7 @@
                 </a:tc>
                 <a:extLst>
                   <a:ext uri="{0D108BD9-81ED-4DB2-BD59-A6C34878D82A}">
-                    <a16:rowId xmlns:a16="http://schemas.microsoft.com/office/drawing/2014/main" val="10001"/>
+                    <a16:rowId xmlns:a16="http://schemas.microsoft.com/office/drawing/2014/main" xmlns="" val="10001"/>
                   </a:ext>
                 </a:extLst>
               </a:tr>
@@ -5220,7 +5212,7 @@
                 </a:tc>
                 <a:extLst>
                   <a:ext uri="{0D108BD9-81ED-4DB2-BD59-A6C34878D82A}">
-                    <a16:rowId xmlns:a16="http://schemas.microsoft.com/office/drawing/2014/main" val="10002"/>
+                    <a16:rowId xmlns:a16="http://schemas.microsoft.com/office/drawing/2014/main" xmlns="" val="10002"/>
                   </a:ext>
                 </a:extLst>
               </a:tr>
@@ -5394,7 +5386,7 @@
                 </a:tc>
                 <a:extLst>
                   <a:ext uri="{0D108BD9-81ED-4DB2-BD59-A6C34878D82A}">
-                    <a16:rowId xmlns:a16="http://schemas.microsoft.com/office/drawing/2014/main" val="10003"/>
+                    <a16:rowId xmlns:a16="http://schemas.microsoft.com/office/drawing/2014/main" xmlns="" val="10003"/>
                   </a:ext>
                 </a:extLst>
               </a:tr>
@@ -5562,7 +5554,7 @@
                 </a:tc>
                 <a:extLst>
                   <a:ext uri="{0D108BD9-81ED-4DB2-BD59-A6C34878D82A}">
-                    <a16:rowId xmlns:a16="http://schemas.microsoft.com/office/drawing/2014/main" val="10004"/>
+                    <a16:rowId xmlns:a16="http://schemas.microsoft.com/office/drawing/2014/main" xmlns="" val="10004"/>
                   </a:ext>
                 </a:extLst>
               </a:tr>
@@ -5730,7 +5722,7 @@
                 </a:tc>
                 <a:extLst>
                   <a:ext uri="{0D108BD9-81ED-4DB2-BD59-A6C34878D82A}">
-                    <a16:rowId xmlns:a16="http://schemas.microsoft.com/office/drawing/2014/main" val="10005"/>
+                    <a16:rowId xmlns:a16="http://schemas.microsoft.com/office/drawing/2014/main" xmlns="" val="10005"/>
                   </a:ext>
                 </a:extLst>
               </a:tr>
@@ -6645,7 +6637,7 @@
           <a:graphicData uri="http://schemas.openxmlformats.org/presentationml/2006/ole">
             <mc:AlternateContent xmlns:mc="http://schemas.openxmlformats.org/markup-compatibility/2006">
               <mc:Choice xmlns:v="urn:schemas-microsoft-com:vml" Requires="v">
-                <p:oleObj spid="_x0000_s6393" name="Equation" r:id="rId3" imgW="190440" imgH="304560" progId="Equation.DSMT4">
+                <p:oleObj spid="_x0000_s6403" name="Equation" r:id="rId3" imgW="190440" imgH="304560" progId="Equation.DSMT4">
                   <p:embed/>
                 </p:oleObj>
               </mc:Choice>
@@ -6702,7 +6694,7 @@
           <a:graphicData uri="http://schemas.openxmlformats.org/presentationml/2006/ole">
             <mc:AlternateContent xmlns:mc="http://schemas.openxmlformats.org/markup-compatibility/2006">
               <mc:Choice xmlns:v="urn:schemas-microsoft-com:vml" Requires="v">
-                <p:oleObj spid="_x0000_s6394" name="Equation" r:id="rId5" imgW="647640" imgH="634680" progId="Equation.DSMT4">
+                <p:oleObj spid="_x0000_s6404" name="Equation" r:id="rId5" imgW="647640" imgH="634680" progId="Equation.DSMT4">
                   <p:embed/>
                 </p:oleObj>
               </mc:Choice>
@@ -6759,7 +6751,7 @@
           <a:graphicData uri="http://schemas.openxmlformats.org/presentationml/2006/ole">
             <mc:AlternateContent xmlns:mc="http://schemas.openxmlformats.org/markup-compatibility/2006">
               <mc:Choice xmlns:v="urn:schemas-microsoft-com:vml" Requires="v">
-                <p:oleObj spid="_x0000_s6395" name="Equation" r:id="rId7" imgW="596880" imgH="507960" progId="Equation.DSMT4">
+                <p:oleObj spid="_x0000_s6405" name="Equation" r:id="rId7" imgW="596880" imgH="507960" progId="Equation.DSMT4">
                   <p:embed/>
                 </p:oleObj>
               </mc:Choice>
@@ -6816,7 +6808,7 @@
           <a:graphicData uri="http://schemas.openxmlformats.org/presentationml/2006/ole">
             <mc:AlternateContent xmlns:mc="http://schemas.openxmlformats.org/markup-compatibility/2006">
               <mc:Choice xmlns:v="urn:schemas-microsoft-com:vml" Requires="v">
-                <p:oleObj spid="_x0000_s6396" name="Equation" r:id="rId9" imgW="749160" imgH="444240" progId="Equation.DSMT4">
+                <p:oleObj spid="_x0000_s6406" name="Equation" r:id="rId9" imgW="749160" imgH="444240" progId="Equation.DSMT4">
                   <p:embed/>
                 </p:oleObj>
               </mc:Choice>
@@ -6873,7 +6865,7 @@
           <a:graphicData uri="http://schemas.openxmlformats.org/presentationml/2006/ole">
             <mc:AlternateContent xmlns:mc="http://schemas.openxmlformats.org/markup-compatibility/2006">
               <mc:Choice xmlns:v="urn:schemas-microsoft-com:vml" Requires="v">
-                <p:oleObj spid="_x0000_s6397" name="Equation" r:id="rId11" imgW="1117440" imgH="482400" progId="Equation.DSMT4">
+                <p:oleObj spid="_x0000_s6407" name="Equation" r:id="rId11" imgW="1117440" imgH="482400" progId="Equation.DSMT4">
                   <p:embed/>
                 </p:oleObj>
               </mc:Choice>
@@ -7055,7 +7047,7 @@
           <a:graphicData uri="http://schemas.openxmlformats.org/presentationml/2006/ole">
             <mc:AlternateContent xmlns:mc="http://schemas.openxmlformats.org/markup-compatibility/2006">
               <mc:Choice xmlns:v="urn:schemas-microsoft-com:vml" Requires="v">
-                <p:oleObj spid="_x0000_s7269" name="Equation" r:id="rId3" imgW="736560" imgH="342720" progId="Equation.DSMT4">
+                <p:oleObj spid="_x0000_s7273" name="Equation" r:id="rId3" imgW="736560" imgH="342720" progId="Equation.DSMT4">
                   <p:embed/>
                 </p:oleObj>
               </mc:Choice>
@@ -7112,7 +7104,7 @@
           <a:graphicData uri="http://schemas.openxmlformats.org/presentationml/2006/ole">
             <mc:AlternateContent xmlns:mc="http://schemas.openxmlformats.org/markup-compatibility/2006">
               <mc:Choice xmlns:v="urn:schemas-microsoft-com:vml" Requires="v">
-                <p:oleObj spid="_x0000_s7270" name="Equation" r:id="rId5" imgW="799920" imgH="444240" progId="Equation.DSMT4">
+                <p:oleObj spid="_x0000_s7274" name="Equation" r:id="rId5" imgW="799920" imgH="444240" progId="Equation.DSMT4">
                   <p:embed/>
                 </p:oleObj>
               </mc:Choice>
@@ -7231,11 +7223,7 @@
           <a:p>
             <a:r>
               <a:rPr lang="en-US" dirty="0" smtClean="0"/>
-              <a:t>Optimum </a:t>
-            </a:r>
-            <a:r>
-              <a:rPr lang="en-US" dirty="0" smtClean="0"/>
-              <a:t>PTS: for every symbol, one needs to scan all possible combinations of the M coefficients and all possible values of those coefficients- impractical</a:t>
+              <a:t>Optimum PTS: for every symbol, one needs to scan all possible combinations of the M coefficients and all possible values of those coefficients- impractical</a:t>
             </a:r>
           </a:p>
           <a:p>
@@ -7333,7 +7321,7 @@
           <a:graphicData uri="http://schemas.openxmlformats.org/presentationml/2006/ole">
             <mc:AlternateContent xmlns:mc="http://schemas.openxmlformats.org/markup-compatibility/2006">
               <mc:Choice xmlns:v="urn:schemas-microsoft-com:vml" Requires="v">
-                <p:oleObj spid="_x0000_s9312" name="Equation" r:id="rId3" imgW="1257120" imgH="253800" progId="Equation.DSMT4">
+                <p:oleObj spid="_x0000_s9316" name="Equation" r:id="rId3" imgW="1257120" imgH="253800" progId="Equation.DSMT4">
                   <p:embed/>
                 </p:oleObj>
               </mc:Choice>
@@ -7390,7 +7378,7 @@
           <a:graphicData uri="http://schemas.openxmlformats.org/presentationml/2006/ole">
             <mc:AlternateContent xmlns:mc="http://schemas.openxmlformats.org/markup-compatibility/2006">
               <mc:Choice xmlns:v="urn:schemas-microsoft-com:vml" Requires="v">
-                <p:oleObj spid="_x0000_s9313" name="Equation" r:id="rId5" imgW="952200" imgH="533160" progId="Equation.DSMT4">
+                <p:oleObj spid="_x0000_s9317" name="Equation" r:id="rId5" imgW="952200" imgH="533160" progId="Equation.DSMT4">
                   <p:embed/>
                 </p:oleObj>
               </mc:Choice>
@@ -7574,13 +7562,8 @@
             </a:pPr>
             <a:r>
               <a:rPr lang="en-US" dirty="0" smtClean="0"/>
-              <a:t>Repeat step 2 for m=3,…,</a:t>
-            </a:r>
-            <a:r>
-              <a:rPr lang="en-US" dirty="0" smtClean="0"/>
-              <a:t>M</a:t>
-            </a:r>
-            <a:endParaRPr lang="en-US" dirty="0" smtClean="0"/>
+              <a:t>Repeat step 2 for m=3,…,M</a:t>
+            </a:r>
           </a:p>
           <a:p>
             <a:pPr marL="514350" indent="-514350">
@@ -9653,11 +9636,7 @@
             </a:pPr>
             <a:r>
               <a:rPr lang="en-US" sz="2600" dirty="0" smtClean="0"/>
-              <a:t>Reduced </a:t>
-            </a:r>
-            <a:r>
-              <a:rPr lang="en-US" sz="2600" dirty="0" smtClean="0"/>
-              <a:t>Complexity algorithm: </a:t>
+              <a:t>Reduced Complexity algorithm: </a:t>
             </a:r>
             <a:r>
               <a:rPr lang="en-US" sz="2600" dirty="0"/>
@@ -9828,7 +9807,7 @@
           <a:graphicData uri="http://schemas.openxmlformats.org/presentationml/2006/ole">
             <mc:AlternateContent xmlns:mc="http://schemas.openxmlformats.org/markup-compatibility/2006">
               <mc:Choice xmlns:v="urn:schemas-microsoft-com:vml" Requires="v">
-                <p:oleObj spid="_x0000_s11346" name="Equation" r:id="rId3" imgW="965160" imgH="457200" progId="Equation.DSMT4">
+                <p:oleObj spid="_x0000_s11350" name="Equation" r:id="rId3" imgW="965160" imgH="457200" progId="Equation.DSMT4">
                   <p:embed/>
                 </p:oleObj>
               </mc:Choice>
@@ -9885,7 +9864,7 @@
           <a:graphicData uri="http://schemas.openxmlformats.org/presentationml/2006/ole">
             <mc:AlternateContent xmlns:mc="http://schemas.openxmlformats.org/markup-compatibility/2006">
               <mc:Choice xmlns:v="urn:schemas-microsoft-com:vml" Requires="v">
-                <p:oleObj spid="_x0000_s11347" name="Equation" r:id="rId5" imgW="698400" imgH="203040" progId="Equation.DSMT4">
+                <p:oleObj spid="_x0000_s11351" name="Equation" r:id="rId5" imgW="698400" imgH="203040" progId="Equation.DSMT4">
                   <p:embed/>
                 </p:oleObj>
               </mc:Choice>
@@ -11107,7 +11086,7 @@
           <a:graphicData uri="http://schemas.openxmlformats.org/presentationml/2006/ole">
             <mc:AlternateContent xmlns:mc="http://schemas.openxmlformats.org/markup-compatibility/2006">
               <mc:Choice xmlns:v="urn:schemas-microsoft-com:vml" Requires="v">
-                <p:oleObj spid="_x0000_s1095" name="Equation" r:id="rId4" imgW="1562040" imgH="444240" progId="Equation.DSMT4">
+                <p:oleObj spid="_x0000_s1097" name="Equation" r:id="rId4" imgW="1562040" imgH="444240" progId="Equation.DSMT4">
                   <p:embed/>
                 </p:oleObj>
               </mc:Choice>
@@ -12000,7 +11979,7 @@
           <a:graphicData uri="http://schemas.openxmlformats.org/presentationml/2006/ole">
             <mc:AlternateContent xmlns:mc="http://schemas.openxmlformats.org/markup-compatibility/2006">
               <mc:Choice xmlns:v="urn:schemas-microsoft-com:vml" Requires="v">
-                <p:oleObj spid="_x0000_s4162" name="Equation" r:id="rId4" imgW="1562040" imgH="444240" progId="Equation.DSMT4">
+                <p:oleObj spid="_x0000_s4164" name="Equation" r:id="rId4" imgW="1562040" imgH="444240" progId="Equation.DSMT4">
                   <p:embed/>
                 </p:oleObj>
               </mc:Choice>
@@ -12185,15 +12164,7 @@
           <a:p>
             <a:r>
               <a:rPr lang="en-US" dirty="0" smtClean="0"/>
-              <a:t>Not </a:t>
-            </a:r>
-            <a:r>
-              <a:rPr lang="en-US" dirty="0" smtClean="0"/>
-              <a:t>saturating </a:t>
-            </a:r>
-            <a:r>
-              <a:rPr lang="en-US" dirty="0" smtClean="0"/>
-              <a:t>nor Increasing: compromise on </a:t>
+              <a:t>Not saturating nor Increasing: compromise on </a:t>
             </a:r>
             <a:r>
               <a:rPr lang="en-US" dirty="0" err="1" smtClean="0"/>
@@ -12385,7 +12356,7 @@
             <p:ph idx="1"/>
             <p:extLst>
               <p:ext uri="{D42A27DB-BD31-4B8C-83A1-F6EECF244321}">
-                <p14:modId xmlns:p14="http://schemas.microsoft.com/office/powerpoint/2010/main" val="3413391354"/>
+                <p14:modId xmlns:p14="http://schemas.microsoft.com/office/powerpoint/2010/main" val="2319004050"/>
               </p:ext>
             </p:extLst>
           </p:nvPr>
@@ -12398,7 +12369,7 @@
           <a:graphicData uri="http://schemas.openxmlformats.org/presentationml/2006/ole">
             <mc:AlternateContent xmlns:mc="http://schemas.openxmlformats.org/markup-compatibility/2006">
               <mc:Choice xmlns:v="urn:schemas-microsoft-com:vml" Requires="v">
-                <p:oleObj spid="_x0000_s12306" name="Equation" r:id="rId3" imgW="1892160" imgH="761760" progId="Equation.DSMT4">
+                <p:oleObj spid="_x0000_s12308" name="Equation" r:id="rId3" imgW="1892160" imgH="761760" progId="Equation.DSMT4">
                   <p:embed/>
                 </p:oleObj>
               </mc:Choice>
@@ -12607,7 +12578,7 @@
           <a:graphicData uri="http://schemas.openxmlformats.org/presentationml/2006/ole">
             <mc:AlternateContent xmlns:mc="http://schemas.openxmlformats.org/markup-compatibility/2006">
               <mc:Choice xmlns:v="urn:schemas-microsoft-com:vml" Requires="v">
-                <p:oleObj spid="_x0000_s5320" name="Equation" r:id="rId4" imgW="1117440" imgH="291960" progId="Equation.DSMT4">
+                <p:oleObj spid="_x0000_s5326" name="Equation" r:id="rId4" imgW="1117440" imgH="291960" progId="Equation.DSMT4">
                   <p:embed/>
                 </p:oleObj>
               </mc:Choice>
@@ -12664,7 +12635,7 @@
           <a:graphicData uri="http://schemas.openxmlformats.org/presentationml/2006/ole">
             <mc:AlternateContent xmlns:mc="http://schemas.openxmlformats.org/markup-compatibility/2006">
               <mc:Choice xmlns:v="urn:schemas-microsoft-com:vml" Requires="v">
-                <p:oleObj spid="_x0000_s5321" name="Equation" r:id="rId6" imgW="1625400" imgH="457200" progId="Equation.DSMT4">
+                <p:oleObj spid="_x0000_s5327" name="Equation" r:id="rId6" imgW="1625400" imgH="457200" progId="Equation.DSMT4">
                   <p:embed/>
                 </p:oleObj>
               </mc:Choice>
@@ -12721,7 +12692,7 @@
           <a:graphicData uri="http://schemas.openxmlformats.org/presentationml/2006/ole">
             <mc:AlternateContent xmlns:mc="http://schemas.openxmlformats.org/markup-compatibility/2006">
               <mc:Choice xmlns:v="urn:schemas-microsoft-com:vml" Requires="v">
-                <p:oleObj spid="_x0000_s5322" name="Equation" r:id="rId8" imgW="1930320" imgH="495000" progId="Equation.DSMT4">
+                <p:oleObj spid="_x0000_s5328" name="Equation" r:id="rId8" imgW="1930320" imgH="495000" progId="Equation.DSMT4">
                   <p:embed/>
                 </p:oleObj>
               </mc:Choice>

</xml_diff>